<commit_message>
Finalize Project 03 structure and README updates
</commit_message>
<xml_diff>
--- a/projects/project-02-data_visualization-python-developer-survey/slides/developer_technology_trends.pptx
+++ b/projects/project-02-data_visualization-python-developer-survey/slides/developer_technology_trends.pptx
@@ -3623,10 +3623,10 @@
       </p:sp>
       <p:pic>
         <p:nvPicPr>
-          <p:cNvPr id="3" name="Picture 2">
+          <p:cNvPr id="4" name="Picture 3">
             <a:extLst>
               <a:ext uri="{FF2B5EF4-FFF2-40B4-BE49-F238E27FC236}">
-                <a16:creationId xmlns:a16="http://schemas.microsoft.com/office/drawing/2014/main" id="{96B47283-5F73-90F2-C269-2AACAE03B031}"/>
+                <a16:creationId xmlns:a16="http://schemas.microsoft.com/office/drawing/2014/main" id="{2589902C-C2B5-0DAE-432C-D8E7BE4AE1EF}"/>
               </a:ext>
             </a:extLst>
           </p:cNvPr>
@@ -3643,8 +3643,8 @@
         </p:blipFill>
         <p:spPr>
           <a:xfrm>
-            <a:off x="1570383" y="1375006"/>
-            <a:ext cx="8849189" cy="5061851"/>
+            <a:off x="1669345" y="1352497"/>
+            <a:ext cx="8853309" cy="5064178"/>
           </a:xfrm>
           <a:prstGeom prst="rect">
             <a:avLst/>
@@ -7853,18 +7853,6 @@
 </file>
 
 <file path=customXml/item1.xml><?xml version="1.0" encoding="utf-8"?>
-<p:properties xmlns:p="http://schemas.microsoft.com/office/2006/metadata/properties" xmlns:xsi="http://www.w3.org/2001/XMLSchema-instance" xmlns:pc="http://schemas.microsoft.com/office/infopath/2007/PartnerControls">
-  <documentManagement>
-    <lcf76f155ced4ddcb4097134ff3c332f xmlns="155be751-a274-42e8-93fb-f39d3b9bccc8">
-      <Terms xmlns="http://schemas.microsoft.com/office/infopath/2007/PartnerControls"/>
-    </lcf76f155ced4ddcb4097134ff3c332f>
-    <TaxCatchAll xmlns="f80a141d-92ca-4d3d-9308-f7e7b1d44ce8" xsi:nil="true"/>
-    <AWBlink xmlns="155be751-a274-42e8-93fb-f39d3b9bccc8" xsi:nil="true"/>
-  </documentManagement>
-</p:properties>
-</file>
-
-<file path=customXml/item2.xml><?xml version="1.0" encoding="utf-8"?>
 <ct:contentTypeSchema xmlns:ct="http://schemas.microsoft.com/office/2006/metadata/contentType" xmlns:ma="http://schemas.microsoft.com/office/2006/metadata/properties/metaAttributes" ct:_="" ma:_="" ma:contentTypeName="Document" ma:contentTypeID="0x010100EECD86F56755A646AC8AFCBCBD967F21" ma:contentTypeVersion="19" ma:contentTypeDescription="Create a new document." ma:contentTypeScope="" ma:versionID="d7279d4efbac013e02c1e816bc7f7c13">
   <xsd:schema xmlns:xsd="http://www.w3.org/2001/XMLSchema" xmlns:xs="http://www.w3.org/2001/XMLSchema" xmlns:p="http://schemas.microsoft.com/office/2006/metadata/properties" xmlns:ns2="155be751-a274-42e8-93fb-f39d3b9bccc8" xmlns:ns3="f80a141d-92ca-4d3d-9308-f7e7b1d44ce8" targetNamespace="http://schemas.microsoft.com/office/2006/metadata/properties" ma:root="true" ma:fieldsID="0a3fd1dbe83fc08387abb87098562ef0" ns2:_="" ns3:_="">
     <xsd:import namespace="155be751-a274-42e8-93fb-f39d3b9bccc8"/>
@@ -8121,6 +8109,18 @@
 </ct:contentTypeSchema>
 </file>
 
+<file path=customXml/item2.xml><?xml version="1.0" encoding="utf-8"?>
+<p:properties xmlns:p="http://schemas.microsoft.com/office/2006/metadata/properties" xmlns:xsi="http://www.w3.org/2001/XMLSchema-instance" xmlns:pc="http://schemas.microsoft.com/office/infopath/2007/PartnerControls">
+  <documentManagement>
+    <lcf76f155ced4ddcb4097134ff3c332f xmlns="155be751-a274-42e8-93fb-f39d3b9bccc8">
+      <Terms xmlns="http://schemas.microsoft.com/office/infopath/2007/PartnerControls"/>
+    </lcf76f155ced4ddcb4097134ff3c332f>
+    <TaxCatchAll xmlns="f80a141d-92ca-4d3d-9308-f7e7b1d44ce8" xsi:nil="true"/>
+    <AWBlink xmlns="155be751-a274-42e8-93fb-f39d3b9bccc8" xsi:nil="true"/>
+  </documentManagement>
+</p:properties>
+</file>
+
 <file path=customXml/item3.xml><?xml version="1.0" encoding="utf-8"?>
 <?mso-contentType ?>
 <FormTemplates xmlns="http://schemas.microsoft.com/sharepoint/v3/contenttype/forms">
@@ -8131,23 +8131,6 @@
 </file>
 
 <file path=customXml/itemProps1.xml><?xml version="1.0" encoding="utf-8"?>
-<ds:datastoreItem xmlns:ds="http://schemas.openxmlformats.org/officeDocument/2006/customXml" ds:itemID="{54DA07C5-A406-4A0D-B3E6-3856C94AC7F3}">
-  <ds:schemaRefs>
-    <ds:schemaRef ds:uri="155be751-a274-42e8-93fb-f39d3b9bccc8"/>
-    <ds:schemaRef ds:uri="http://purl.org/dc/elements/1.1/"/>
-    <ds:schemaRef ds:uri="http://schemas.microsoft.com/office/2006/metadata/properties"/>
-    <ds:schemaRef ds:uri="http://schemas.microsoft.com/office/2006/documentManagement/types"/>
-    <ds:schemaRef ds:uri="http://schemas.openxmlformats.org/package/2006/metadata/core-properties"/>
-    <ds:schemaRef ds:uri="http://purl.org/dc/dcmitype/"/>
-    <ds:schemaRef ds:uri="http://schemas.microsoft.com/office/infopath/2007/PartnerControls"/>
-    <ds:schemaRef ds:uri="f80a141d-92ca-4d3d-9308-f7e7b1d44ce8"/>
-    <ds:schemaRef ds:uri="http://www.w3.org/XML/1998/namespace"/>
-    <ds:schemaRef ds:uri="http://purl.org/dc/terms/"/>
-  </ds:schemaRefs>
-</ds:datastoreItem>
-</file>
-
-<file path=customXml/itemProps2.xml><?xml version="1.0" encoding="utf-8"?>
 <ds:datastoreItem xmlns:ds="http://schemas.openxmlformats.org/officeDocument/2006/customXml" ds:itemID="{BEAB06F8-DBB4-44C7-AF84-8B098C8B039F}">
   <ds:schemaRefs>
     <ds:schemaRef ds:uri="http://schemas.microsoft.com/office/2006/metadata/contentType"/>
@@ -8166,6 +8149,23 @@
 </ds:datastoreItem>
 </file>
 
+<file path=customXml/itemProps2.xml><?xml version="1.0" encoding="utf-8"?>
+<ds:datastoreItem xmlns:ds="http://schemas.openxmlformats.org/officeDocument/2006/customXml" ds:itemID="{54DA07C5-A406-4A0D-B3E6-3856C94AC7F3}">
+  <ds:schemaRefs>
+    <ds:schemaRef ds:uri="155be751-a274-42e8-93fb-f39d3b9bccc8"/>
+    <ds:schemaRef ds:uri="http://purl.org/dc/elements/1.1/"/>
+    <ds:schemaRef ds:uri="http://schemas.microsoft.com/office/2006/metadata/properties"/>
+    <ds:schemaRef ds:uri="http://schemas.microsoft.com/office/2006/documentManagement/types"/>
+    <ds:schemaRef ds:uri="http://schemas.openxmlformats.org/package/2006/metadata/core-properties"/>
+    <ds:schemaRef ds:uri="http://purl.org/dc/dcmitype/"/>
+    <ds:schemaRef ds:uri="http://schemas.microsoft.com/office/infopath/2007/PartnerControls"/>
+    <ds:schemaRef ds:uri="f80a141d-92ca-4d3d-9308-f7e7b1d44ce8"/>
+    <ds:schemaRef ds:uri="http://www.w3.org/XML/1998/namespace"/>
+    <ds:schemaRef ds:uri="http://purl.org/dc/terms/"/>
+  </ds:schemaRefs>
+</ds:datastoreItem>
+</file>
+
 <file path=customXml/itemProps3.xml><?xml version="1.0" encoding="utf-8"?>
 <ds:datastoreItem xmlns:ds="http://schemas.openxmlformats.org/officeDocument/2006/customXml" ds:itemID="{7EFDA260-DDA0-422C-B7AE-778F653FBB36}">
   <ds:schemaRefs>

</xml_diff>